<commit_message>
Updated Bachelor Thesis and added 3d models as image
</commit_message>
<xml_diff>
--- a/thesis/sketch_concept.pptx
+++ b/thesis/sketch_concept.pptx
@@ -243,7 +243,7 @@
           <a:p>
             <a:fld id="{0EA81038-F128-47FD-8732-CEF995A70821}" type="datetimeFigureOut">
               <a:rPr lang="de-DE" smtClean="0"/>
-              <a:t>10.08.2016</a:t>
+              <a:t>28.08.2016</a:t>
             </a:fld>
             <a:endParaRPr lang="de-DE"/>
           </a:p>
@@ -413,7 +413,7 @@
           <a:p>
             <a:fld id="{0EA81038-F128-47FD-8732-CEF995A70821}" type="datetimeFigureOut">
               <a:rPr lang="de-DE" smtClean="0"/>
-              <a:t>10.08.2016</a:t>
+              <a:t>28.08.2016</a:t>
             </a:fld>
             <a:endParaRPr lang="de-DE"/>
           </a:p>
@@ -593,7 +593,7 @@
           <a:p>
             <a:fld id="{0EA81038-F128-47FD-8732-CEF995A70821}" type="datetimeFigureOut">
               <a:rPr lang="de-DE" smtClean="0"/>
-              <a:t>10.08.2016</a:t>
+              <a:t>28.08.2016</a:t>
             </a:fld>
             <a:endParaRPr lang="de-DE"/>
           </a:p>
@@ -763,7 +763,7 @@
           <a:p>
             <a:fld id="{0EA81038-F128-47FD-8732-CEF995A70821}" type="datetimeFigureOut">
               <a:rPr lang="de-DE" smtClean="0"/>
-              <a:t>10.08.2016</a:t>
+              <a:t>28.08.2016</a:t>
             </a:fld>
             <a:endParaRPr lang="de-DE"/>
           </a:p>
@@ -1009,7 +1009,7 @@
           <a:p>
             <a:fld id="{0EA81038-F128-47FD-8732-CEF995A70821}" type="datetimeFigureOut">
               <a:rPr lang="de-DE" smtClean="0"/>
-              <a:t>10.08.2016</a:t>
+              <a:t>28.08.2016</a:t>
             </a:fld>
             <a:endParaRPr lang="de-DE"/>
           </a:p>
@@ -1241,7 +1241,7 @@
           <a:p>
             <a:fld id="{0EA81038-F128-47FD-8732-CEF995A70821}" type="datetimeFigureOut">
               <a:rPr lang="de-DE" smtClean="0"/>
-              <a:t>10.08.2016</a:t>
+              <a:t>28.08.2016</a:t>
             </a:fld>
             <a:endParaRPr lang="de-DE"/>
           </a:p>
@@ -1608,7 +1608,7 @@
           <a:p>
             <a:fld id="{0EA81038-F128-47FD-8732-CEF995A70821}" type="datetimeFigureOut">
               <a:rPr lang="de-DE" smtClean="0"/>
-              <a:t>10.08.2016</a:t>
+              <a:t>28.08.2016</a:t>
             </a:fld>
             <a:endParaRPr lang="de-DE"/>
           </a:p>
@@ -1726,7 +1726,7 @@
           <a:p>
             <a:fld id="{0EA81038-F128-47FD-8732-CEF995A70821}" type="datetimeFigureOut">
               <a:rPr lang="de-DE" smtClean="0"/>
-              <a:t>10.08.2016</a:t>
+              <a:t>28.08.2016</a:t>
             </a:fld>
             <a:endParaRPr lang="de-DE"/>
           </a:p>
@@ -1821,7 +1821,7 @@
           <a:p>
             <a:fld id="{0EA81038-F128-47FD-8732-CEF995A70821}" type="datetimeFigureOut">
               <a:rPr lang="de-DE" smtClean="0"/>
-              <a:t>10.08.2016</a:t>
+              <a:t>28.08.2016</a:t>
             </a:fld>
             <a:endParaRPr lang="de-DE"/>
           </a:p>
@@ -2098,7 +2098,7 @@
           <a:p>
             <a:fld id="{0EA81038-F128-47FD-8732-CEF995A70821}" type="datetimeFigureOut">
               <a:rPr lang="de-DE" smtClean="0"/>
-              <a:t>10.08.2016</a:t>
+              <a:t>28.08.2016</a:t>
             </a:fld>
             <a:endParaRPr lang="de-DE"/>
           </a:p>
@@ -2351,7 +2351,7 @@
           <a:p>
             <a:fld id="{0EA81038-F128-47FD-8732-CEF995A70821}" type="datetimeFigureOut">
               <a:rPr lang="de-DE" smtClean="0"/>
-              <a:t>10.08.2016</a:t>
+              <a:t>28.08.2016</a:t>
             </a:fld>
             <a:endParaRPr lang="de-DE"/>
           </a:p>
@@ -2564,7 +2564,7 @@
           <a:p>
             <a:fld id="{0EA81038-F128-47FD-8732-CEF995A70821}" type="datetimeFigureOut">
               <a:rPr lang="de-DE" smtClean="0"/>
-              <a:t>10.08.2016</a:t>
+              <a:t>28.08.2016</a:t>
             </a:fld>
             <a:endParaRPr lang="de-DE"/>
           </a:p>
@@ -2992,34 +2992,52 @@
           <a:lstStyle/>
           <a:p>
             <a:r>
-              <a:rPr lang="de-DE" dirty="0" smtClean="0"/>
+              <a:rPr lang="de-DE" dirty="0" smtClean="0">
+                <a:latin typeface="Palatino Linotype" panose="02040502050505030304" pitchFamily="18" charset="0"/>
+              </a:rPr>
               <a:t/>
             </a:r>
             <a:br>
-              <a:rPr lang="de-DE" dirty="0" smtClean="0"/>
+              <a:rPr lang="de-DE" dirty="0" smtClean="0">
+                <a:latin typeface="Palatino Linotype" panose="02040502050505030304" pitchFamily="18" charset="0"/>
+              </a:rPr>
             </a:br>
             <a:r>
-              <a:rPr lang="de-DE" dirty="0"/>
+              <a:rPr lang="de-DE" dirty="0">
+                <a:latin typeface="Palatino Linotype" panose="02040502050505030304" pitchFamily="18" charset="0"/>
+              </a:rPr>
               <a:t/>
             </a:r>
             <a:br>
-              <a:rPr lang="de-DE" dirty="0"/>
+              <a:rPr lang="de-DE" dirty="0">
+                <a:latin typeface="Palatino Linotype" panose="02040502050505030304" pitchFamily="18" charset="0"/>
+              </a:rPr>
             </a:br>
             <a:r>
-              <a:rPr lang="de-DE" dirty="0" smtClean="0"/>
+              <a:rPr lang="de-DE" dirty="0" smtClean="0">
+                <a:latin typeface="Palatino Linotype" panose="02040502050505030304" pitchFamily="18" charset="0"/>
+              </a:rPr>
               <a:t/>
             </a:r>
             <a:br>
-              <a:rPr lang="de-DE" dirty="0" smtClean="0"/>
+              <a:rPr lang="de-DE" dirty="0" smtClean="0">
+                <a:latin typeface="Palatino Linotype" panose="02040502050505030304" pitchFamily="18" charset="0"/>
+              </a:rPr>
             </a:br>
             <a:r>
-              <a:rPr lang="de-DE" dirty="0"/>
+              <a:rPr lang="de-DE" dirty="0">
+                <a:latin typeface="Palatino Linotype" panose="02040502050505030304" pitchFamily="18" charset="0"/>
+              </a:rPr>
               <a:t/>
             </a:r>
             <a:br>
-              <a:rPr lang="de-DE" dirty="0"/>
+              <a:rPr lang="de-DE" dirty="0">
+                <a:latin typeface="Palatino Linotype" panose="02040502050505030304" pitchFamily="18" charset="0"/>
+              </a:rPr>
             </a:br>
-            <a:endParaRPr lang="de-DE" dirty="0"/>
+            <a:endParaRPr lang="de-DE" dirty="0">
+              <a:latin typeface="Palatino Linotype" panose="02040502050505030304" pitchFamily="18" charset="0"/>
+            </a:endParaRPr>
           </a:p>
         </p:txBody>
       </p:sp>
@@ -3072,6 +3090,7 @@
                 <a:solidFill>
                   <a:schemeClr val="tx1"/>
                 </a:solidFill>
+                <a:latin typeface="Palatino Linotype" panose="02040502050505030304" pitchFamily="18" charset="0"/>
               </a:rPr>
               <a:t>Canon EOS 600D</a:t>
             </a:r>
@@ -3079,6 +3098,7 @@
               <a:solidFill>
                 <a:schemeClr val="tx1"/>
               </a:solidFill>
+              <a:latin typeface="Palatino Linotype" panose="02040502050505030304" pitchFamily="18" charset="0"/>
             </a:endParaRPr>
           </a:p>
         </p:txBody>
@@ -3128,17 +3148,19 @@
           <a:p>
             <a:pPr algn="ctr"/>
             <a:r>
-              <a:rPr lang="de-DE" sz="2400" dirty="0" smtClean="0">
+              <a:rPr lang="de-DE" sz="2000" dirty="0" smtClean="0">
                 <a:solidFill>
                   <a:schemeClr val="tx1"/>
                 </a:solidFill>
+                <a:latin typeface="Palatino Linotype" panose="02040502050505030304" pitchFamily="18" charset="0"/>
               </a:rPr>
               <a:t>Nexus 7 (2012)</a:t>
             </a:r>
-            <a:endParaRPr lang="de-DE" sz="2400" dirty="0">
+            <a:endParaRPr lang="de-DE" sz="2000" dirty="0">
               <a:solidFill>
                 <a:schemeClr val="tx1"/>
               </a:solidFill>
+              <a:latin typeface="Palatino Linotype" panose="02040502050505030304" pitchFamily="18" charset="0"/>
             </a:endParaRPr>
           </a:p>
         </p:txBody>
@@ -3192,6 +3214,7 @@
                 <a:solidFill>
                   <a:schemeClr val="tx1"/>
                 </a:solidFill>
+                <a:latin typeface="Palatino Linotype" panose="02040502050505030304" pitchFamily="18" charset="0"/>
               </a:rPr>
               <a:t>PHP-Server</a:t>
             </a:r>
@@ -3199,6 +3222,7 @@
               <a:solidFill>
                 <a:schemeClr val="tx1"/>
               </a:solidFill>
+              <a:latin typeface="Palatino Linotype" panose="02040502050505030304" pitchFamily="18" charset="0"/>
             </a:endParaRPr>
           </a:p>
         </p:txBody>
@@ -3250,6 +3274,7 @@
                 <a:solidFill>
                   <a:schemeClr val="tx1"/>
                 </a:solidFill>
+                <a:latin typeface="Palatino Linotype" panose="02040502050505030304" pitchFamily="18" charset="0"/>
               </a:rPr>
               <a:t>Fotobox</a:t>
             </a:r>
@@ -3257,6 +3282,7 @@
               <a:solidFill>
                 <a:schemeClr val="tx1"/>
               </a:solidFill>
+              <a:latin typeface="Palatino Linotype" panose="02040502050505030304" pitchFamily="18" charset="0"/>
             </a:endParaRPr>
           </a:p>
         </p:txBody>
@@ -3372,10 +3398,11 @@
           <a:p>
             <a:pPr algn="ctr"/>
             <a:r>
-              <a:rPr lang="de-DE" sz="2400" dirty="0" smtClean="0">
+              <a:rPr lang="de-DE" sz="2000" dirty="0" smtClean="0">
                 <a:solidFill>
                   <a:schemeClr val="tx1"/>
                 </a:solidFill>
+                <a:latin typeface="Palatino Linotype" panose="02040502050505030304" pitchFamily="18" charset="0"/>
               </a:rPr>
               <a:t>TP-LINK</a:t>
             </a:r>
@@ -3383,10 +3410,11 @@
           <a:p>
             <a:pPr algn="ctr"/>
             <a:r>
-              <a:rPr lang="de-DE" sz="2400" dirty="0">
+              <a:rPr lang="de-DE" sz="2000" dirty="0">
                 <a:solidFill>
                   <a:schemeClr val="tx1"/>
                 </a:solidFill>
+                <a:latin typeface="Palatino Linotype" panose="02040502050505030304" pitchFamily="18" charset="0"/>
               </a:rPr>
               <a:t>MR3040</a:t>
             </a:r>
@@ -3430,7 +3458,9 @@
           <a:p>
             <a:pPr algn="ctr"/>
             <a:r>
-              <a:rPr lang="de-DE" sz="2400" dirty="0" smtClean="0"/>
+              <a:rPr lang="de-DE" sz="2000" dirty="0" smtClean="0">
+                <a:latin typeface="Palatino Linotype" panose="02040502050505030304" pitchFamily="18" charset="0"/>
+              </a:rPr>
               <a:t>WIFI</a:t>
             </a:r>
           </a:p>
@@ -3506,10 +3536,14 @@
           <a:p>
             <a:pPr algn="ctr"/>
             <a:r>
-              <a:rPr lang="de-DE" dirty="0" smtClean="0"/>
+              <a:rPr lang="de-DE" sz="2000" dirty="0" smtClean="0">
+                <a:latin typeface="Palatino Linotype" panose="02040502050505030304" pitchFamily="18" charset="0"/>
+              </a:rPr>
               <a:t>HTTP Post</a:t>
             </a:r>
-            <a:endParaRPr lang="de-DE" dirty="0"/>
+            <a:endParaRPr lang="de-DE" sz="2000" dirty="0">
+              <a:latin typeface="Palatino Linotype" panose="02040502050505030304" pitchFamily="18" charset="0"/>
+            </a:endParaRPr>
           </a:p>
         </p:txBody>
       </p:sp>
@@ -3562,6 +3596,7 @@
                 <a:solidFill>
                   <a:schemeClr val="tx1"/>
                 </a:solidFill>
+                <a:latin typeface="Palatino Linotype" panose="02040502050505030304" pitchFamily="18" charset="0"/>
               </a:rPr>
               <a:t>Nutzer</a:t>
             </a:r>
@@ -3569,6 +3604,7 @@
               <a:solidFill>
                 <a:schemeClr val="tx1"/>
               </a:solidFill>
+              <a:latin typeface="Palatino Linotype" panose="02040502050505030304" pitchFamily="18" charset="0"/>
             </a:endParaRPr>
           </a:p>
         </p:txBody>
@@ -3676,10 +3712,14 @@
           <a:p>
             <a:pPr algn="ctr"/>
             <a:r>
-              <a:rPr lang="de-DE" sz="2400" dirty="0" smtClean="0"/>
+              <a:rPr lang="de-DE" sz="2000" dirty="0" smtClean="0">
+                <a:latin typeface="Palatino Linotype" panose="02040502050505030304" pitchFamily="18" charset="0"/>
+              </a:rPr>
               <a:t>USB</a:t>
             </a:r>
-            <a:endParaRPr lang="de-DE" sz="2400" dirty="0"/>
+            <a:endParaRPr lang="de-DE" sz="2000" dirty="0">
+              <a:latin typeface="Palatino Linotype" panose="02040502050505030304" pitchFamily="18" charset="0"/>
+            </a:endParaRPr>
           </a:p>
         </p:txBody>
       </p:sp>
@@ -3765,6 +3805,7 @@
                 <a:solidFill>
                   <a:schemeClr val="tx1"/>
                 </a:solidFill>
+                <a:latin typeface="Palatino Linotype" panose="02040502050505030304" pitchFamily="18" charset="0"/>
               </a:rPr>
               <a:t>Yongnuo</a:t>
             </a:r>
@@ -3772,22 +3813,34 @@
               <a:solidFill>
                 <a:schemeClr val="tx1"/>
               </a:solidFill>
+              <a:latin typeface="Palatino Linotype" panose="02040502050505030304" pitchFamily="18" charset="0"/>
             </a:endParaRPr>
           </a:p>
           <a:p>
             <a:pPr algn="ctr"/>
+            <a:r>
+              <a:rPr lang="de-DE" sz="2400" smtClean="0">
+                <a:solidFill>
+                  <a:schemeClr val="tx1"/>
+                </a:solidFill>
+                <a:latin typeface="Palatino Linotype" panose="02040502050505030304" pitchFamily="18" charset="0"/>
+              </a:rPr>
+              <a:t>RF-603C </a:t>
+            </a:r>
             <a:r>
               <a:rPr lang="de-DE" sz="2400" dirty="0" smtClean="0">
                 <a:solidFill>
                   <a:schemeClr val="tx1"/>
                 </a:solidFill>
+                <a:latin typeface="Palatino Linotype" panose="02040502050505030304" pitchFamily="18" charset="0"/>
               </a:rPr>
-              <a:t>RF603C II</a:t>
+              <a:t>II</a:t>
             </a:r>
             <a:endParaRPr lang="de-DE" sz="2400" dirty="0">
               <a:solidFill>
                 <a:schemeClr val="tx1"/>
               </a:solidFill>
+              <a:latin typeface="Palatino Linotype" panose="02040502050505030304" pitchFamily="18" charset="0"/>
             </a:endParaRPr>
           </a:p>
         </p:txBody>
@@ -3834,7 +3887,9 @@
           <a:lstStyle/>
           <a:p>
             <a:pPr algn="ctr"/>
-            <a:endParaRPr lang="de-DE"/>
+            <a:endParaRPr lang="de-DE">
+              <a:latin typeface="Palatino Linotype" panose="02040502050505030304" pitchFamily="18" charset="0"/>
+            </a:endParaRPr>
           </a:p>
         </p:txBody>
       </p:sp>
@@ -3846,8 +3901,8 @@
         </p:nvSpPr>
         <p:spPr>
           <a:xfrm>
-            <a:off x="58196" y="5610936"/>
-            <a:ext cx="2825004" cy="584775"/>
+            <a:off x="130385" y="5610936"/>
+            <a:ext cx="2688557" cy="523220"/>
           </a:xfrm>
           <a:prstGeom prst="rect">
             <a:avLst/>
@@ -3861,10 +3916,14 @@
           <a:lstStyle/>
           <a:p>
             <a:r>
-              <a:rPr lang="de-DE" sz="3200" dirty="0" smtClean="0"/>
+              <a:rPr lang="de-DE" sz="2800" dirty="0" smtClean="0">
+                <a:latin typeface="Palatino Linotype" panose="02040502050505030304" pitchFamily="18" charset="0"/>
+              </a:rPr>
               <a:t>Grobhandtaster</a:t>
             </a:r>
-            <a:endParaRPr lang="de-DE" sz="3200" dirty="0"/>
+            <a:endParaRPr lang="de-DE" sz="2800" dirty="0">
+              <a:latin typeface="Palatino Linotype" panose="02040502050505030304" pitchFamily="18" charset="0"/>
+            </a:endParaRPr>
           </a:p>
         </p:txBody>
       </p:sp>
@@ -3876,8 +3935,8 @@
         </p:nvCxnSpPr>
         <p:spPr>
           <a:xfrm flipH="1">
-            <a:off x="2576951" y="5237621"/>
-            <a:ext cx="1530393" cy="1"/>
+            <a:off x="3042169" y="5237621"/>
+            <a:ext cx="1080000" cy="1"/>
           </a:xfrm>
           <a:prstGeom prst="straightConnector1">
             <a:avLst/>
@@ -4016,6 +4075,7 @@
                 <a:solidFill>
                   <a:schemeClr val="tx1"/>
                 </a:solidFill>
+                <a:latin typeface="Palatino Linotype" panose="02040502050505030304" pitchFamily="18" charset="0"/>
               </a:rPr>
               <a:t>Yongnuo</a:t>
             </a:r>
@@ -4023,6 +4083,7 @@
               <a:solidFill>
                 <a:schemeClr val="tx1"/>
               </a:solidFill>
+              <a:latin typeface="Palatino Linotype" panose="02040502050505030304" pitchFamily="18" charset="0"/>
             </a:endParaRPr>
           </a:p>
           <a:p>
@@ -4032,13 +4093,24 @@
                 <a:solidFill>
                   <a:schemeClr val="tx1"/>
                 </a:solidFill>
+                <a:latin typeface="Palatino Linotype" panose="02040502050505030304" pitchFamily="18" charset="0"/>
               </a:rPr>
-              <a:t>RF603C II</a:t>
+              <a:t>RF-603C </a:t>
+            </a:r>
+            <a:r>
+              <a:rPr lang="de-DE" sz="2400" dirty="0" smtClean="0">
+                <a:solidFill>
+                  <a:schemeClr val="tx1"/>
+                </a:solidFill>
+                <a:latin typeface="Palatino Linotype" panose="02040502050505030304" pitchFamily="18" charset="0"/>
+              </a:rPr>
+              <a:t>II</a:t>
             </a:r>
             <a:endParaRPr lang="de-DE" sz="2400" dirty="0">
               <a:solidFill>
                 <a:schemeClr val="tx1"/>
               </a:solidFill>
+              <a:latin typeface="Palatino Linotype" panose="02040502050505030304" pitchFamily="18" charset="0"/>
             </a:endParaRPr>
           </a:p>
         </p:txBody>
@@ -4076,39 +4148,6 @@
           </a:fontRef>
         </p:style>
       </p:cxnSp>
-      <p:cxnSp>
-        <p:nvCxnSpPr>
-          <p:cNvPr id="82" name="Gerade Verbindung mit Pfeil 81"/>
-          <p:cNvCxnSpPr/>
-          <p:nvPr/>
-        </p:nvCxnSpPr>
-        <p:spPr>
-          <a:xfrm flipV="1">
-            <a:off x="2638371" y="3367095"/>
-            <a:ext cx="360000" cy="0"/>
-          </a:xfrm>
-          <a:prstGeom prst="straightConnector1">
-            <a:avLst/>
-          </a:prstGeom>
-          <a:ln>
-            <a:tailEnd type="triangle"/>
-          </a:ln>
-        </p:spPr>
-        <p:style>
-          <a:lnRef idx="1">
-            <a:schemeClr val="accent1"/>
-          </a:lnRef>
-          <a:fillRef idx="0">
-            <a:schemeClr val="accent1"/>
-          </a:fillRef>
-          <a:effectRef idx="0">
-            <a:schemeClr val="accent1"/>
-          </a:effectRef>
-          <a:fontRef idx="minor">
-            <a:schemeClr val="tx1"/>
-          </a:fontRef>
-        </p:style>
-      </p:cxnSp>
       <p:sp>
         <p:nvSpPr>
           <p:cNvPr id="85" name="Abgerundetes Rechteck 84"/>
@@ -4117,7 +4156,7 @@
         </p:nvSpPr>
         <p:spPr>
           <a:xfrm>
-            <a:off x="3064871" y="2991119"/>
+            <a:off x="9168911" y="3680925"/>
             <a:ext cx="2344654" cy="735802"/>
           </a:xfrm>
           <a:prstGeom prst="roundRect">
@@ -4158,6 +4197,7 @@
                 <a:solidFill>
                   <a:schemeClr val="tx1"/>
                 </a:solidFill>
+                <a:latin typeface="Palatino Linotype" panose="02040502050505030304" pitchFamily="18" charset="0"/>
               </a:rPr>
               <a:t>Yongnuo</a:t>
             </a:r>
@@ -4165,6 +4205,7 @@
               <a:solidFill>
                 <a:schemeClr val="tx1"/>
               </a:solidFill>
+              <a:latin typeface="Palatino Linotype" panose="02040502050505030304" pitchFamily="18" charset="0"/>
             </a:endParaRPr>
           </a:p>
           <a:p>
@@ -4174,9 +4215,128 @@
                 <a:solidFill>
                   <a:schemeClr val="tx1"/>
                 </a:solidFill>
+                <a:latin typeface="Palatino Linotype" panose="02040502050505030304" pitchFamily="18" charset="0"/>
               </a:rPr>
               <a:t>YN560-III</a:t>
             </a:r>
+          </a:p>
+        </p:txBody>
+      </p:sp>
+      <p:cxnSp>
+        <p:nvCxnSpPr>
+          <p:cNvPr id="13" name="Gewinkelte Verbindung 12"/>
+          <p:cNvCxnSpPr>
+            <a:stCxn id="77" idx="3"/>
+            <a:endCxn id="85" idx="1"/>
+          </p:cNvCxnSpPr>
+          <p:nvPr/>
+        </p:nvCxnSpPr>
+        <p:spPr>
+          <a:xfrm>
+            <a:off x="2571871" y="3359020"/>
+            <a:ext cx="6597040" cy="689806"/>
+          </a:xfrm>
+          <a:prstGeom prst="bentConnector3">
+            <a:avLst/>
+          </a:prstGeom>
+          <a:ln>
+            <a:tailEnd type="triangle"/>
+          </a:ln>
+        </p:spPr>
+        <p:style>
+          <a:lnRef idx="1">
+            <a:schemeClr val="accent1"/>
+          </a:lnRef>
+          <a:fillRef idx="0">
+            <a:schemeClr val="accent1"/>
+          </a:fillRef>
+          <a:effectRef idx="0">
+            <a:schemeClr val="accent1"/>
+          </a:effectRef>
+          <a:fontRef idx="minor">
+            <a:schemeClr val="tx1"/>
+          </a:fontRef>
+        </p:style>
+      </p:cxnSp>
+      <p:sp>
+        <p:nvSpPr>
+          <p:cNvPr id="32" name="Rechteck 31"/>
+          <p:cNvSpPr/>
+          <p:nvPr/>
+        </p:nvSpPr>
+        <p:spPr>
+          <a:xfrm>
+            <a:off x="8938990" y="3348920"/>
+            <a:ext cx="2772000" cy="1852365"/>
+          </a:xfrm>
+          <a:prstGeom prst="rect">
+            <a:avLst/>
+          </a:prstGeom>
+          <a:noFill/>
+          <a:ln>
+            <a:solidFill>
+              <a:srgbClr val="C00000"/>
+            </a:solidFill>
+          </a:ln>
+        </p:spPr>
+        <p:style>
+          <a:lnRef idx="2">
+            <a:schemeClr val="accent1">
+              <a:shade val="50000"/>
+            </a:schemeClr>
+          </a:lnRef>
+          <a:fillRef idx="1">
+            <a:schemeClr val="accent1"/>
+          </a:fillRef>
+          <a:effectRef idx="0">
+            <a:schemeClr val="accent1"/>
+          </a:effectRef>
+          <a:fontRef idx="minor">
+            <a:schemeClr val="lt1"/>
+          </a:fontRef>
+        </p:style>
+        <p:txBody>
+          <a:bodyPr rtlCol="0" anchor="ctr"/>
+          <a:lstStyle/>
+          <a:p>
+            <a:pPr algn="ctr"/>
+            <a:endParaRPr lang="de-DE">
+              <a:latin typeface="Palatino Linotype" panose="02040502050505030304" pitchFamily="18" charset="0"/>
+            </a:endParaRPr>
+          </a:p>
+        </p:txBody>
+      </p:sp>
+      <p:sp>
+        <p:nvSpPr>
+          <p:cNvPr id="19" name="Textfeld 18"/>
+          <p:cNvSpPr txBox="1"/>
+          <p:nvPr/>
+        </p:nvSpPr>
+        <p:spPr>
+          <a:xfrm>
+            <a:off x="9287336" y="4553183"/>
+            <a:ext cx="2422029" cy="523220"/>
+          </a:xfrm>
+          <a:prstGeom prst="rect">
+            <a:avLst/>
+          </a:prstGeom>
+          <a:noFill/>
+        </p:spPr>
+        <p:txBody>
+          <a:bodyPr wrap="square" rtlCol="0">
+            <a:spAutoFit/>
+          </a:bodyPr>
+          <a:lstStyle/>
+          <a:p>
+            <a:r>
+              <a:rPr lang="de-DE" sz="2800" dirty="0" smtClean="0">
+                <a:latin typeface="Palatino Linotype" panose="02040502050505030304" pitchFamily="18" charset="0"/>
+              </a:rPr>
+              <a:t>Reflexschirm</a:t>
+            </a:r>
+            <a:endParaRPr lang="de-DE" sz="2800" dirty="0">
+              <a:latin typeface="Palatino Linotype" panose="02040502050505030304" pitchFamily="18" charset="0"/>
+            </a:endParaRPr>
           </a:p>
         </p:txBody>
       </p:sp>

</xml_diff>

<commit_message>
Added new concept sketch, added header and page numbers
</commit_message>
<xml_diff>
--- a/thesis/sketch_concept.pptx
+++ b/thesis/sketch_concept.pptx
@@ -243,7 +243,7 @@
           <a:p>
             <a:fld id="{0EA81038-F128-47FD-8732-CEF995A70821}" type="datetimeFigureOut">
               <a:rPr lang="de-DE" smtClean="0"/>
-              <a:t>28.08.2016</a:t>
+              <a:t>28.09.2016</a:t>
             </a:fld>
             <a:endParaRPr lang="de-DE"/>
           </a:p>
@@ -413,7 +413,7 @@
           <a:p>
             <a:fld id="{0EA81038-F128-47FD-8732-CEF995A70821}" type="datetimeFigureOut">
               <a:rPr lang="de-DE" smtClean="0"/>
-              <a:t>28.08.2016</a:t>
+              <a:t>28.09.2016</a:t>
             </a:fld>
             <a:endParaRPr lang="de-DE"/>
           </a:p>
@@ -593,7 +593,7 @@
           <a:p>
             <a:fld id="{0EA81038-F128-47FD-8732-CEF995A70821}" type="datetimeFigureOut">
               <a:rPr lang="de-DE" smtClean="0"/>
-              <a:t>28.08.2016</a:t>
+              <a:t>28.09.2016</a:t>
             </a:fld>
             <a:endParaRPr lang="de-DE"/>
           </a:p>
@@ -763,7 +763,7 @@
           <a:p>
             <a:fld id="{0EA81038-F128-47FD-8732-CEF995A70821}" type="datetimeFigureOut">
               <a:rPr lang="de-DE" smtClean="0"/>
-              <a:t>28.08.2016</a:t>
+              <a:t>28.09.2016</a:t>
             </a:fld>
             <a:endParaRPr lang="de-DE"/>
           </a:p>
@@ -1009,7 +1009,7 @@
           <a:p>
             <a:fld id="{0EA81038-F128-47FD-8732-CEF995A70821}" type="datetimeFigureOut">
               <a:rPr lang="de-DE" smtClean="0"/>
-              <a:t>28.08.2016</a:t>
+              <a:t>28.09.2016</a:t>
             </a:fld>
             <a:endParaRPr lang="de-DE"/>
           </a:p>
@@ -1241,7 +1241,7 @@
           <a:p>
             <a:fld id="{0EA81038-F128-47FD-8732-CEF995A70821}" type="datetimeFigureOut">
               <a:rPr lang="de-DE" smtClean="0"/>
-              <a:t>28.08.2016</a:t>
+              <a:t>28.09.2016</a:t>
             </a:fld>
             <a:endParaRPr lang="de-DE"/>
           </a:p>
@@ -1608,7 +1608,7 @@
           <a:p>
             <a:fld id="{0EA81038-F128-47FD-8732-CEF995A70821}" type="datetimeFigureOut">
               <a:rPr lang="de-DE" smtClean="0"/>
-              <a:t>28.08.2016</a:t>
+              <a:t>28.09.2016</a:t>
             </a:fld>
             <a:endParaRPr lang="de-DE"/>
           </a:p>
@@ -1726,7 +1726,7 @@
           <a:p>
             <a:fld id="{0EA81038-F128-47FD-8732-CEF995A70821}" type="datetimeFigureOut">
               <a:rPr lang="de-DE" smtClean="0"/>
-              <a:t>28.08.2016</a:t>
+              <a:t>28.09.2016</a:t>
             </a:fld>
             <a:endParaRPr lang="de-DE"/>
           </a:p>
@@ -1821,7 +1821,7 @@
           <a:p>
             <a:fld id="{0EA81038-F128-47FD-8732-CEF995A70821}" type="datetimeFigureOut">
               <a:rPr lang="de-DE" smtClean="0"/>
-              <a:t>28.08.2016</a:t>
+              <a:t>28.09.2016</a:t>
             </a:fld>
             <a:endParaRPr lang="de-DE"/>
           </a:p>
@@ -2098,7 +2098,7 @@
           <a:p>
             <a:fld id="{0EA81038-F128-47FD-8732-CEF995A70821}" type="datetimeFigureOut">
               <a:rPr lang="de-DE" smtClean="0"/>
-              <a:t>28.08.2016</a:t>
+              <a:t>28.09.2016</a:t>
             </a:fld>
             <a:endParaRPr lang="de-DE"/>
           </a:p>
@@ -2351,7 +2351,7 @@
           <a:p>
             <a:fld id="{0EA81038-F128-47FD-8732-CEF995A70821}" type="datetimeFigureOut">
               <a:rPr lang="de-DE" smtClean="0"/>
-              <a:t>28.08.2016</a:t>
+              <a:t>28.09.2016</a:t>
             </a:fld>
             <a:endParaRPr lang="de-DE"/>
           </a:p>
@@ -2564,7 +2564,7 @@
           <a:p>
             <a:fld id="{0EA81038-F128-47FD-8732-CEF995A70821}" type="datetimeFigureOut">
               <a:rPr lang="de-DE" smtClean="0"/>
-              <a:t>28.08.2016</a:t>
+              <a:t>28.09.2016</a:t>
             </a:fld>
             <a:endParaRPr lang="de-DE"/>
           </a:p>
@@ -3092,7 +3092,7 @@
                 </a:solidFill>
                 <a:latin typeface="Palatino Linotype" panose="02040502050505030304" pitchFamily="18" charset="0"/>
               </a:rPr>
-              <a:t>Canon EOS 600D</a:t>
+              <a:t>Kamera</a:t>
             </a:r>
             <a:endParaRPr lang="de-DE" sz="2800" dirty="0">
               <a:solidFill>
@@ -3148,13 +3148,13 @@
           <a:p>
             <a:pPr algn="ctr"/>
             <a:r>
-              <a:rPr lang="de-DE" sz="2000" dirty="0" smtClean="0">
+              <a:rPr lang="de-DE" sz="2000" smtClean="0">
                 <a:solidFill>
                   <a:schemeClr val="tx1"/>
                 </a:solidFill>
                 <a:latin typeface="Palatino Linotype" panose="02040502050505030304" pitchFamily="18" charset="0"/>
               </a:rPr>
-              <a:t>Nexus 7 (2012)</a:t>
+              <a:t>Tablet</a:t>
             </a:r>
             <a:endParaRPr lang="de-DE" sz="2000" dirty="0">
               <a:solidFill>
@@ -3398,25 +3398,13 @@
           <a:p>
             <a:pPr algn="ctr"/>
             <a:r>
-              <a:rPr lang="de-DE" sz="2000" dirty="0" smtClean="0">
+              <a:rPr lang="de-DE" sz="2000" smtClean="0">
                 <a:solidFill>
                   <a:schemeClr val="tx1"/>
                 </a:solidFill>
                 <a:latin typeface="Palatino Linotype" panose="02040502050505030304" pitchFamily="18" charset="0"/>
               </a:rPr>
-              <a:t>TP-LINK</a:t>
-            </a:r>
-          </a:p>
-          <a:p>
-            <a:pPr algn="ctr"/>
-            <a:r>
-              <a:rPr lang="de-DE" sz="2000" dirty="0">
-                <a:solidFill>
-                  <a:schemeClr val="tx1"/>
-                </a:solidFill>
-                <a:latin typeface="Palatino Linotype" panose="02040502050505030304" pitchFamily="18" charset="0"/>
-              </a:rPr>
-              <a:t>MR3040</a:t>
+              <a:t>WLAN Bridge</a:t>
             </a:r>
           </a:p>
         </p:txBody>
@@ -3598,7 +3586,7 @@
                 </a:solidFill>
                 <a:latin typeface="Palatino Linotype" panose="02040502050505030304" pitchFamily="18" charset="0"/>
               </a:rPr>
-              <a:t>Nutzer</a:t>
+              <a:t>Anwender</a:t>
             </a:r>
             <a:endParaRPr lang="de-DE" sz="2400" dirty="0">
               <a:solidFill>
@@ -3801,40 +3789,13 @@
           <a:p>
             <a:pPr algn="ctr"/>
             <a:r>
-              <a:rPr lang="de-DE" sz="2400" dirty="0" err="1" smtClean="0">
-                <a:solidFill>
-                  <a:schemeClr val="tx1"/>
-                </a:solidFill>
-                <a:latin typeface="Palatino Linotype" panose="02040502050505030304" pitchFamily="18" charset="0"/>
-              </a:rPr>
-              <a:t>Yongnuo</a:t>
-            </a:r>
-            <a:endParaRPr lang="de-DE" sz="2400" dirty="0" smtClean="0">
-              <a:solidFill>
-                <a:schemeClr val="tx1"/>
-              </a:solidFill>
-              <a:latin typeface="Palatino Linotype" panose="02040502050505030304" pitchFamily="18" charset="0"/>
-            </a:endParaRPr>
-          </a:p>
-          <a:p>
-            <a:pPr algn="ctr"/>
-            <a:r>
-              <a:rPr lang="de-DE" sz="2400" smtClean="0">
-                <a:solidFill>
-                  <a:schemeClr val="tx1"/>
-                </a:solidFill>
-                <a:latin typeface="Palatino Linotype" panose="02040502050505030304" pitchFamily="18" charset="0"/>
-              </a:rPr>
-              <a:t>RF-603C </a:t>
-            </a:r>
-            <a:r>
               <a:rPr lang="de-DE" sz="2400" dirty="0" smtClean="0">
                 <a:solidFill>
                   <a:schemeClr val="tx1"/>
                 </a:solidFill>
                 <a:latin typeface="Palatino Linotype" panose="02040502050505030304" pitchFamily="18" charset="0"/>
               </a:rPr>
-              <a:t>II</a:t>
+              <a:t>Sender</a:t>
             </a:r>
             <a:endParaRPr lang="de-DE" sz="2400" dirty="0">
               <a:solidFill>
@@ -4071,40 +4032,25 @@
           <a:p>
             <a:pPr algn="ctr"/>
             <a:r>
-              <a:rPr lang="de-DE" sz="2400" dirty="0" err="1" smtClean="0">
+              <a:rPr lang="de-DE" sz="2400" smtClean="0">
                 <a:solidFill>
                   <a:schemeClr val="tx1"/>
                 </a:solidFill>
                 <a:latin typeface="Palatino Linotype" panose="02040502050505030304" pitchFamily="18" charset="0"/>
               </a:rPr>
-              <a:t>Yongnuo</a:t>
-            </a:r>
-            <a:endParaRPr lang="de-DE" sz="2400" dirty="0" smtClean="0">
-              <a:solidFill>
-                <a:schemeClr val="tx1"/>
-              </a:solidFill>
-              <a:latin typeface="Palatino Linotype" panose="02040502050505030304" pitchFamily="18" charset="0"/>
-            </a:endParaRPr>
+              <a:t>Empfänger/</a:t>
+            </a:r>
           </a:p>
           <a:p>
             <a:pPr algn="ctr"/>
             <a:r>
-              <a:rPr lang="de-DE" sz="2400" dirty="0" smtClean="0">
+              <a:rPr lang="de-DE" sz="2400" smtClean="0">
                 <a:solidFill>
                   <a:schemeClr val="tx1"/>
                 </a:solidFill>
                 <a:latin typeface="Palatino Linotype" panose="02040502050505030304" pitchFamily="18" charset="0"/>
               </a:rPr>
-              <a:t>RF-603C </a:t>
-            </a:r>
-            <a:r>
-              <a:rPr lang="de-DE" sz="2400" dirty="0" smtClean="0">
-                <a:solidFill>
-                  <a:schemeClr val="tx1"/>
-                </a:solidFill>
-                <a:latin typeface="Palatino Linotype" panose="02040502050505030304" pitchFamily="18" charset="0"/>
-              </a:rPr>
-              <a:t>II</a:t>
+              <a:t>Sender</a:t>
             </a:r>
             <a:endParaRPr lang="de-DE" sz="2400" dirty="0">
               <a:solidFill>
@@ -4193,31 +4139,13 @@
           <a:p>
             <a:pPr algn="ctr"/>
             <a:r>
-              <a:rPr lang="de-DE" sz="2400" dirty="0" err="1" smtClean="0">
-                <a:solidFill>
-                  <a:schemeClr val="tx1"/>
-                </a:solidFill>
-                <a:latin typeface="Palatino Linotype" panose="02040502050505030304" pitchFamily="18" charset="0"/>
-              </a:rPr>
-              <a:t>Yongnuo</a:t>
-            </a:r>
-            <a:endParaRPr lang="de-DE" sz="2400" dirty="0" smtClean="0">
-              <a:solidFill>
-                <a:schemeClr val="tx1"/>
-              </a:solidFill>
-              <a:latin typeface="Palatino Linotype" panose="02040502050505030304" pitchFamily="18" charset="0"/>
-            </a:endParaRPr>
-          </a:p>
-          <a:p>
-            <a:pPr algn="ctr"/>
-            <a:r>
               <a:rPr lang="de-DE" sz="2400" dirty="0" smtClean="0">
                 <a:solidFill>
                   <a:schemeClr val="tx1"/>
                 </a:solidFill>
                 <a:latin typeface="Palatino Linotype" panose="02040502050505030304" pitchFamily="18" charset="0"/>
               </a:rPr>
-              <a:t>YN560-III</a:t>
+              <a:t>Blitz mit Empfänger</a:t>
             </a:r>
           </a:p>
         </p:txBody>

</xml_diff>